<commit_message>
registered business and started github project
</commit_message>
<xml_diff>
--- a/website/src/assets/images/logo.pptx
+++ b/website/src/assets/images/logo.pptx
@@ -7,6 +7,7 @@
   <p:sldIdLst>
     <p:sldId id="256" r:id="rId2"/>
     <p:sldId id="257" r:id="rId3"/>
+    <p:sldId id="258" r:id="rId4"/>
   </p:sldIdLst>
   <p:sldSz cx="9144000" cy="9144000"/>
   <p:notesSz cx="6858000" cy="9144000"/>
@@ -244,7 +245,7 @@
           <a:p>
             <a:fld id="{26852F48-D327-4878-8EFE-C8F634FD84EF}" type="datetimeFigureOut">
               <a:rPr lang="en-US" smtClean="0"/>
-              <a:t>2/13/2025</a:t>
+              <a:t>3/6/2025</a:t>
             </a:fld>
             <a:endParaRPr lang="en-US"/>
           </a:p>
@@ -414,7 +415,7 @@
           <a:p>
             <a:fld id="{26852F48-D327-4878-8EFE-C8F634FD84EF}" type="datetimeFigureOut">
               <a:rPr lang="en-US" smtClean="0"/>
-              <a:t>2/13/2025</a:t>
+              <a:t>3/6/2025</a:t>
             </a:fld>
             <a:endParaRPr lang="en-US"/>
           </a:p>
@@ -594,7 +595,7 @@
           <a:p>
             <a:fld id="{26852F48-D327-4878-8EFE-C8F634FD84EF}" type="datetimeFigureOut">
               <a:rPr lang="en-US" smtClean="0"/>
-              <a:t>2/13/2025</a:t>
+              <a:t>3/6/2025</a:t>
             </a:fld>
             <a:endParaRPr lang="en-US"/>
           </a:p>
@@ -764,7 +765,7 @@
           <a:p>
             <a:fld id="{26852F48-D327-4878-8EFE-C8F634FD84EF}" type="datetimeFigureOut">
               <a:rPr lang="en-US" smtClean="0"/>
-              <a:t>2/13/2025</a:t>
+              <a:t>3/6/2025</a:t>
             </a:fld>
             <a:endParaRPr lang="en-US"/>
           </a:p>
@@ -1010,7 +1011,7 @@
           <a:p>
             <a:fld id="{26852F48-D327-4878-8EFE-C8F634FD84EF}" type="datetimeFigureOut">
               <a:rPr lang="en-US" smtClean="0"/>
-              <a:t>2/13/2025</a:t>
+              <a:t>3/6/2025</a:t>
             </a:fld>
             <a:endParaRPr lang="en-US"/>
           </a:p>
@@ -1242,7 +1243,7 @@
           <a:p>
             <a:fld id="{26852F48-D327-4878-8EFE-C8F634FD84EF}" type="datetimeFigureOut">
               <a:rPr lang="en-US" smtClean="0"/>
-              <a:t>2/13/2025</a:t>
+              <a:t>3/6/2025</a:t>
             </a:fld>
             <a:endParaRPr lang="en-US"/>
           </a:p>
@@ -1609,7 +1610,7 @@
           <a:p>
             <a:fld id="{26852F48-D327-4878-8EFE-C8F634FD84EF}" type="datetimeFigureOut">
               <a:rPr lang="en-US" smtClean="0"/>
-              <a:t>2/13/2025</a:t>
+              <a:t>3/6/2025</a:t>
             </a:fld>
             <a:endParaRPr lang="en-US"/>
           </a:p>
@@ -1727,7 +1728,7 @@
           <a:p>
             <a:fld id="{26852F48-D327-4878-8EFE-C8F634FD84EF}" type="datetimeFigureOut">
               <a:rPr lang="en-US" smtClean="0"/>
-              <a:t>2/13/2025</a:t>
+              <a:t>3/6/2025</a:t>
             </a:fld>
             <a:endParaRPr lang="en-US"/>
           </a:p>
@@ -1822,7 +1823,7 @@
           <a:p>
             <a:fld id="{26852F48-D327-4878-8EFE-C8F634FD84EF}" type="datetimeFigureOut">
               <a:rPr lang="en-US" smtClean="0"/>
-              <a:t>2/13/2025</a:t>
+              <a:t>3/6/2025</a:t>
             </a:fld>
             <a:endParaRPr lang="en-US"/>
           </a:p>
@@ -2099,7 +2100,7 @@
           <a:p>
             <a:fld id="{26852F48-D327-4878-8EFE-C8F634FD84EF}" type="datetimeFigureOut">
               <a:rPr lang="en-US" smtClean="0"/>
-              <a:t>2/13/2025</a:t>
+              <a:t>3/6/2025</a:t>
             </a:fld>
             <a:endParaRPr lang="en-US"/>
           </a:p>
@@ -2356,7 +2357,7 @@
           <a:p>
             <a:fld id="{26852F48-D327-4878-8EFE-C8F634FD84EF}" type="datetimeFigureOut">
               <a:rPr lang="en-US" smtClean="0"/>
-              <a:t>2/13/2025</a:t>
+              <a:t>3/6/2025</a:t>
             </a:fld>
             <a:endParaRPr lang="en-US"/>
           </a:p>
@@ -2569,7 +2570,7 @@
           <a:p>
             <a:fld id="{26852F48-D327-4878-8EFE-C8F634FD84EF}" type="datetimeFigureOut">
               <a:rPr lang="en-US" smtClean="0"/>
-              <a:t>2/13/2025</a:t>
+              <a:t>3/6/2025</a:t>
             </a:fld>
             <a:endParaRPr lang="en-US"/>
           </a:p>
@@ -4941,6 +4942,975 @@
 </p:sld>
 </file>
 
+<file path=ppt/slides/slide3.xml><?xml version="1.0" encoding="utf-8"?>
+<p:sld xmlns:a="http://schemas.openxmlformats.org/drawingml/2006/main" xmlns:r="http://schemas.openxmlformats.org/officeDocument/2006/relationships" xmlns:p="http://schemas.openxmlformats.org/presentationml/2006/main">
+  <p:cSld>
+    <p:bg>
+      <p:bgPr>
+        <a:gradFill flip="none" rotWithShape="1">
+          <a:gsLst>
+            <a:gs pos="6000">
+              <a:srgbClr val="F9EFA0"/>
+            </a:gs>
+            <a:gs pos="39000">
+              <a:srgbClr val="BA8A48"/>
+            </a:gs>
+          </a:gsLst>
+          <a:path path="circle">
+            <a:fillToRect l="50000" t="50000" r="50000" b="50000"/>
+          </a:path>
+          <a:tileRect/>
+        </a:gradFill>
+        <a:effectLst/>
+      </p:bgPr>
+    </p:bg>
+    <p:spTree>
+      <p:nvGrpSpPr>
+        <p:cNvPr id="1" name="">
+          <a:extLst>
+            <a:ext uri="{FF2B5EF4-FFF2-40B4-BE49-F238E27FC236}">
+              <a16:creationId xmlns:a16="http://schemas.microsoft.com/office/drawing/2014/main" id="{83488DC0-4BDD-468F-CBD3-88752B49187B}"/>
+            </a:ext>
+          </a:extLst>
+        </p:cNvPr>
+        <p:cNvGrpSpPr/>
+        <p:nvPr/>
+      </p:nvGrpSpPr>
+      <p:grpSpPr>
+        <a:xfrm>
+          <a:off x="0" y="0"/>
+          <a:ext cx="0" cy="0"/>
+          <a:chOff x="0" y="0"/>
+          <a:chExt cx="0" cy="0"/>
+        </a:xfrm>
+      </p:grpSpPr>
+      <p:sp>
+        <p:nvSpPr>
+          <p:cNvPr id="10" name="Rectangle 9">
+            <a:extLst>
+              <a:ext uri="{FF2B5EF4-FFF2-40B4-BE49-F238E27FC236}">
+                <a16:creationId xmlns:a16="http://schemas.microsoft.com/office/drawing/2014/main" id="{548EE7BD-D0C6-5303-4740-141ADE2F941C}"/>
+              </a:ext>
+            </a:extLst>
+          </p:cNvPr>
+          <p:cNvSpPr/>
+          <p:nvPr/>
+        </p:nvSpPr>
+        <p:spPr>
+          <a:xfrm>
+            <a:off x="0" y="1"/>
+            <a:ext cx="9144001" cy="9144000"/>
+          </a:xfrm>
+          <a:prstGeom prst="rect">
+            <a:avLst/>
+          </a:prstGeom>
+          <a:solidFill>
+            <a:schemeClr val="tx1"/>
+          </a:solidFill>
+          <a:ln>
+            <a:noFill/>
+          </a:ln>
+        </p:spPr>
+        <p:style>
+          <a:lnRef idx="2">
+            <a:schemeClr val="accent1">
+              <a:shade val="15000"/>
+            </a:schemeClr>
+          </a:lnRef>
+          <a:fillRef idx="1">
+            <a:schemeClr val="accent1"/>
+          </a:fillRef>
+          <a:effectRef idx="0">
+            <a:schemeClr val="accent1"/>
+          </a:effectRef>
+          <a:fontRef idx="minor">
+            <a:schemeClr val="lt1"/>
+          </a:fontRef>
+        </p:style>
+        <p:txBody>
+          <a:bodyPr rtlCol="0" anchor="ctr"/>
+          <a:lstStyle/>
+          <a:p>
+            <a:pPr algn="ctr"/>
+            <a:endParaRPr lang="en-US" sz="2400" dirty="0">
+              <a:blipFill dpi="0" rotWithShape="1">
+                <a:blip r:embed="rId2">
+                  <a:extLst>
+                    <a:ext uri="{96DAC541-7B7A-43D3-8B79-37D633B846F1}">
+                      <asvg:svgBlip xmlns:asvg="http://schemas.microsoft.com/office/drawing/2016/SVG/main" r:embed="rId3"/>
+                    </a:ext>
+                  </a:extLst>
+                </a:blip>
+                <a:srcRect/>
+                <a:stretch>
+                  <a:fillRect/>
+                </a:stretch>
+              </a:blipFill>
+            </a:endParaRPr>
+          </a:p>
+        </p:txBody>
+      </p:sp>
+      <p:grpSp>
+        <p:nvGrpSpPr>
+          <p:cNvPr id="6" name="Graphic 4">
+            <a:extLst>
+              <a:ext uri="{FF2B5EF4-FFF2-40B4-BE49-F238E27FC236}">
+                <a16:creationId xmlns:a16="http://schemas.microsoft.com/office/drawing/2014/main" id="{516842F8-FC1E-8BE9-28DE-529A18D5C2CC}"/>
+              </a:ext>
+            </a:extLst>
+          </p:cNvPr>
+          <p:cNvGrpSpPr/>
+          <p:nvPr/>
+        </p:nvGrpSpPr>
+        <p:grpSpPr>
+          <a:xfrm>
+            <a:off x="2419494" y="2419519"/>
+            <a:ext cx="4305012" cy="4304962"/>
+            <a:chOff x="3781371" y="1114381"/>
+            <a:chExt cx="4624041" cy="4623990"/>
+          </a:xfrm>
+          <a:solidFill>
+            <a:srgbClr val="000000"/>
+          </a:solidFill>
+        </p:grpSpPr>
+        <p:sp useBgFill="1">
+          <p:nvSpPr>
+            <p:cNvPr id="7" name="Freeform: Shape 6">
+              <a:extLst>
+                <a:ext uri="{FF2B5EF4-FFF2-40B4-BE49-F238E27FC236}">
+                  <a16:creationId xmlns:a16="http://schemas.microsoft.com/office/drawing/2014/main" id="{1C65E9E8-AFAE-EF7E-40AE-1B1D483492D5}"/>
+                </a:ext>
+              </a:extLst>
+            </p:cNvPr>
+            <p:cNvSpPr/>
+            <p:nvPr/>
+          </p:nvSpPr>
+          <p:spPr>
+            <a:xfrm>
+              <a:off x="3781371" y="3623398"/>
+              <a:ext cx="2114986" cy="2114973"/>
+            </a:xfrm>
+            <a:custGeom>
+              <a:avLst/>
+              <a:gdLst>
+                <a:gd name="connsiteX0" fmla="*/ 51429 w 2114986"/>
+                <a:gd name="connsiteY0" fmla="*/ 2115101 h 2114973"/>
+                <a:gd name="connsiteX1" fmla="*/ 15105 w 2114986"/>
+                <a:gd name="connsiteY1" fmla="*/ 2100047 h 2114973"/>
+                <a:gd name="connsiteX2" fmla="*/ 15105 w 2114986"/>
+                <a:gd name="connsiteY2" fmla="*/ 2027399 h 2114973"/>
+                <a:gd name="connsiteX3" fmla="*/ 2027311 w 2114986"/>
+                <a:gd name="connsiteY3" fmla="*/ 15194 h 2114973"/>
+                <a:gd name="connsiteX4" fmla="*/ 2099959 w 2114986"/>
+                <a:gd name="connsiteY4" fmla="*/ 15194 h 2114973"/>
+                <a:gd name="connsiteX5" fmla="*/ 2099959 w 2114986"/>
+                <a:gd name="connsiteY5" fmla="*/ 87842 h 2114973"/>
+                <a:gd name="connsiteX6" fmla="*/ 87753 w 2114986"/>
+                <a:gd name="connsiteY6" fmla="*/ 2100047 h 2114973"/>
+                <a:gd name="connsiteX7" fmla="*/ 51429 w 2114986"/>
+                <a:gd name="connsiteY7" fmla="*/ 2115101 h 2114973"/>
+              </a:gdLst>
+              <a:ahLst/>
+              <a:cxnLst>
+                <a:cxn ang="0">
+                  <a:pos x="connsiteX0" y="connsiteY0"/>
+                </a:cxn>
+                <a:cxn ang="0">
+                  <a:pos x="connsiteX1" y="connsiteY1"/>
+                </a:cxn>
+                <a:cxn ang="0">
+                  <a:pos x="connsiteX2" y="connsiteY2"/>
+                </a:cxn>
+                <a:cxn ang="0">
+                  <a:pos x="connsiteX3" y="connsiteY3"/>
+                </a:cxn>
+                <a:cxn ang="0">
+                  <a:pos x="connsiteX4" y="connsiteY4"/>
+                </a:cxn>
+                <a:cxn ang="0">
+                  <a:pos x="connsiteX5" y="connsiteY5"/>
+                </a:cxn>
+                <a:cxn ang="0">
+                  <a:pos x="connsiteX6" y="connsiteY6"/>
+                </a:cxn>
+                <a:cxn ang="0">
+                  <a:pos x="connsiteX7" y="connsiteY7"/>
+                </a:cxn>
+              </a:cxnLst>
+              <a:rect l="l" t="t" r="r" b="b"/>
+              <a:pathLst>
+                <a:path w="2114986" h="2114973">
+                  <a:moveTo>
+                    <a:pt x="51429" y="2115101"/>
+                  </a:moveTo>
+                  <a:cubicBezTo>
+                    <a:pt x="38276" y="2115101"/>
+                    <a:pt x="25124" y="2110066"/>
+                    <a:pt x="15105" y="2100047"/>
+                  </a:cubicBezTo>
+                  <a:cubicBezTo>
+                    <a:pt x="-4984" y="2079959"/>
+                    <a:pt x="-4984" y="2047488"/>
+                    <a:pt x="15105" y="2027399"/>
+                  </a:cubicBezTo>
+                  <a:lnTo>
+                    <a:pt x="2027311" y="15194"/>
+                  </a:lnTo>
+                  <a:cubicBezTo>
+                    <a:pt x="2047399" y="-4895"/>
+                    <a:pt x="2079870" y="-4895"/>
+                    <a:pt x="2099959" y="15194"/>
+                  </a:cubicBezTo>
+                  <a:cubicBezTo>
+                    <a:pt x="2120047" y="35282"/>
+                    <a:pt x="2120047" y="67753"/>
+                    <a:pt x="2099959" y="87842"/>
+                  </a:cubicBezTo>
+                  <a:lnTo>
+                    <a:pt x="87753" y="2100047"/>
+                  </a:lnTo>
+                  <a:cubicBezTo>
+                    <a:pt x="77735" y="2110066"/>
+                    <a:pt x="64582" y="2115101"/>
+                    <a:pt x="51429" y="2115101"/>
+                  </a:cubicBezTo>
+                  <a:close/>
+                </a:path>
+              </a:pathLst>
+            </a:custGeom>
+            <a:ln w="51336" cap="flat">
+              <a:noFill/>
+              <a:prstDash val="solid"/>
+              <a:miter/>
+            </a:ln>
+          </p:spPr>
+          <p:txBody>
+            <a:bodyPr rtlCol="0" anchor="ctr"/>
+            <a:lstStyle/>
+            <a:p>
+              <a:endParaRPr lang="en-US" sz="2400"/>
+            </a:p>
+          </p:txBody>
+        </p:sp>
+        <p:sp useBgFill="1">
+          <p:nvSpPr>
+            <p:cNvPr id="8" name="Freeform: Shape 7">
+              <a:extLst>
+                <a:ext uri="{FF2B5EF4-FFF2-40B4-BE49-F238E27FC236}">
+                  <a16:creationId xmlns:a16="http://schemas.microsoft.com/office/drawing/2014/main" id="{FE88B893-D993-7FC7-E1F5-D2DB5092B42A}"/>
+                </a:ext>
+              </a:extLst>
+            </p:cNvPr>
+            <p:cNvSpPr/>
+            <p:nvPr/>
+          </p:nvSpPr>
+          <p:spPr>
+            <a:xfrm>
+              <a:off x="6690180" y="2187662"/>
+              <a:ext cx="667780" cy="667909"/>
+            </a:xfrm>
+            <a:custGeom>
+              <a:avLst/>
+              <a:gdLst>
+                <a:gd name="connsiteX0" fmla="*/ 334070 w 667780"/>
+                <a:gd name="connsiteY0" fmla="*/ 667960 h 667909"/>
+                <a:gd name="connsiteX1" fmla="*/ 97939 w 667780"/>
+                <a:gd name="connsiteY1" fmla="*/ 570137 h 667909"/>
+                <a:gd name="connsiteX2" fmla="*/ 116 w 667780"/>
+                <a:gd name="connsiteY2" fmla="*/ 334006 h 667909"/>
+                <a:gd name="connsiteX3" fmla="*/ 97939 w 667780"/>
+                <a:gd name="connsiteY3" fmla="*/ 97874 h 667909"/>
+                <a:gd name="connsiteX4" fmla="*/ 97939 w 667780"/>
+                <a:gd name="connsiteY4" fmla="*/ 97874 h 667909"/>
+                <a:gd name="connsiteX5" fmla="*/ 97939 w 667780"/>
+                <a:gd name="connsiteY5" fmla="*/ 97874 h 667909"/>
+                <a:gd name="connsiteX6" fmla="*/ 334070 w 667780"/>
+                <a:gd name="connsiteY6" fmla="*/ 51 h 667909"/>
+                <a:gd name="connsiteX7" fmla="*/ 570253 w 667780"/>
+                <a:gd name="connsiteY7" fmla="*/ 97874 h 667909"/>
+                <a:gd name="connsiteX8" fmla="*/ 570253 w 667780"/>
+                <a:gd name="connsiteY8" fmla="*/ 570137 h 667909"/>
+                <a:gd name="connsiteX9" fmla="*/ 334070 w 667780"/>
+                <a:gd name="connsiteY9" fmla="*/ 667960 h 667909"/>
+                <a:gd name="connsiteX10" fmla="*/ 334070 w 667780"/>
+                <a:gd name="connsiteY10" fmla="*/ 102858 h 667909"/>
+                <a:gd name="connsiteX11" fmla="*/ 170587 w 667780"/>
+                <a:gd name="connsiteY11" fmla="*/ 170573 h 667909"/>
+                <a:gd name="connsiteX12" fmla="*/ 170587 w 667780"/>
+                <a:gd name="connsiteY12" fmla="*/ 170573 h 667909"/>
+                <a:gd name="connsiteX13" fmla="*/ 102871 w 667780"/>
+                <a:gd name="connsiteY13" fmla="*/ 334057 h 667909"/>
+                <a:gd name="connsiteX14" fmla="*/ 170587 w 667780"/>
+                <a:gd name="connsiteY14" fmla="*/ 497541 h 667909"/>
+                <a:gd name="connsiteX15" fmla="*/ 334070 w 667780"/>
+                <a:gd name="connsiteY15" fmla="*/ 565257 h 667909"/>
+                <a:gd name="connsiteX16" fmla="*/ 497606 w 667780"/>
+                <a:gd name="connsiteY16" fmla="*/ 497541 h 667909"/>
+                <a:gd name="connsiteX17" fmla="*/ 497606 w 667780"/>
+                <a:gd name="connsiteY17" fmla="*/ 170573 h 667909"/>
+                <a:gd name="connsiteX18" fmla="*/ 334070 w 667780"/>
+                <a:gd name="connsiteY18" fmla="*/ 102858 h 667909"/>
+              </a:gdLst>
+              <a:ahLst/>
+              <a:cxnLst>
+                <a:cxn ang="0">
+                  <a:pos x="connsiteX0" y="connsiteY0"/>
+                </a:cxn>
+                <a:cxn ang="0">
+                  <a:pos x="connsiteX1" y="connsiteY1"/>
+                </a:cxn>
+                <a:cxn ang="0">
+                  <a:pos x="connsiteX2" y="connsiteY2"/>
+                </a:cxn>
+                <a:cxn ang="0">
+                  <a:pos x="connsiteX3" y="connsiteY3"/>
+                </a:cxn>
+                <a:cxn ang="0">
+                  <a:pos x="connsiteX4" y="connsiteY4"/>
+                </a:cxn>
+                <a:cxn ang="0">
+                  <a:pos x="connsiteX5" y="connsiteY5"/>
+                </a:cxn>
+                <a:cxn ang="0">
+                  <a:pos x="connsiteX6" y="connsiteY6"/>
+                </a:cxn>
+                <a:cxn ang="0">
+                  <a:pos x="connsiteX7" y="connsiteY7"/>
+                </a:cxn>
+                <a:cxn ang="0">
+                  <a:pos x="connsiteX8" y="connsiteY8"/>
+                </a:cxn>
+                <a:cxn ang="0">
+                  <a:pos x="connsiteX9" y="connsiteY9"/>
+                </a:cxn>
+                <a:cxn ang="0">
+                  <a:pos x="connsiteX10" y="connsiteY10"/>
+                </a:cxn>
+                <a:cxn ang="0">
+                  <a:pos x="connsiteX11" y="connsiteY11"/>
+                </a:cxn>
+                <a:cxn ang="0">
+                  <a:pos x="connsiteX12" y="connsiteY12"/>
+                </a:cxn>
+                <a:cxn ang="0">
+                  <a:pos x="connsiteX13" y="connsiteY13"/>
+                </a:cxn>
+                <a:cxn ang="0">
+                  <a:pos x="connsiteX14" y="connsiteY14"/>
+                </a:cxn>
+                <a:cxn ang="0">
+                  <a:pos x="connsiteX15" y="connsiteY15"/>
+                </a:cxn>
+                <a:cxn ang="0">
+                  <a:pos x="connsiteX16" y="connsiteY16"/>
+                </a:cxn>
+                <a:cxn ang="0">
+                  <a:pos x="connsiteX17" y="connsiteY17"/>
+                </a:cxn>
+                <a:cxn ang="0">
+                  <a:pos x="connsiteX18" y="connsiteY18"/>
+                </a:cxn>
+              </a:cxnLst>
+              <a:rect l="l" t="t" r="r" b="b"/>
+              <a:pathLst>
+                <a:path w="667780" h="667909">
+                  <a:moveTo>
+                    <a:pt x="334070" y="667960"/>
+                  </a:moveTo>
+                  <a:cubicBezTo>
+                    <a:pt x="244879" y="667960"/>
+                    <a:pt x="161030" y="633229"/>
+                    <a:pt x="97939" y="570137"/>
+                  </a:cubicBezTo>
+                  <a:cubicBezTo>
+                    <a:pt x="34847" y="507097"/>
+                    <a:pt x="116" y="423249"/>
+                    <a:pt x="116" y="334006"/>
+                  </a:cubicBezTo>
+                  <a:cubicBezTo>
+                    <a:pt x="116" y="244763"/>
+                    <a:pt x="34898" y="160914"/>
+                    <a:pt x="97939" y="97874"/>
+                  </a:cubicBezTo>
+                  <a:lnTo>
+                    <a:pt x="97939" y="97874"/>
+                  </a:lnTo>
+                  <a:lnTo>
+                    <a:pt x="97939" y="97874"/>
+                  </a:lnTo>
+                  <a:cubicBezTo>
+                    <a:pt x="161030" y="34782"/>
+                    <a:pt x="244827" y="51"/>
+                    <a:pt x="334070" y="51"/>
+                  </a:cubicBezTo>
+                  <a:cubicBezTo>
+                    <a:pt x="423313" y="51"/>
+                    <a:pt x="507162" y="34782"/>
+                    <a:pt x="570253" y="97874"/>
+                  </a:cubicBezTo>
+                  <a:cubicBezTo>
+                    <a:pt x="700444" y="228116"/>
+                    <a:pt x="700444" y="439946"/>
+                    <a:pt x="570253" y="570137"/>
+                  </a:cubicBezTo>
+                  <a:cubicBezTo>
+                    <a:pt x="507162" y="633229"/>
+                    <a:pt x="423313" y="667960"/>
+                    <a:pt x="334070" y="667960"/>
+                  </a:cubicBezTo>
+                  <a:close/>
+                  <a:moveTo>
+                    <a:pt x="334070" y="102858"/>
+                  </a:moveTo>
+                  <a:cubicBezTo>
+                    <a:pt x="272314" y="102858"/>
+                    <a:pt x="214258" y="126902"/>
+                    <a:pt x="170587" y="170573"/>
+                  </a:cubicBezTo>
+                  <a:lnTo>
+                    <a:pt x="170587" y="170573"/>
+                  </a:lnTo>
+                  <a:cubicBezTo>
+                    <a:pt x="126864" y="214244"/>
+                    <a:pt x="102871" y="272301"/>
+                    <a:pt x="102871" y="334057"/>
+                  </a:cubicBezTo>
+                  <a:cubicBezTo>
+                    <a:pt x="102871" y="395813"/>
+                    <a:pt x="126916" y="453870"/>
+                    <a:pt x="170587" y="497541"/>
+                  </a:cubicBezTo>
+                  <a:cubicBezTo>
+                    <a:pt x="214258" y="541212"/>
+                    <a:pt x="272263" y="565257"/>
+                    <a:pt x="334070" y="565257"/>
+                  </a:cubicBezTo>
+                  <a:cubicBezTo>
+                    <a:pt x="395878" y="565257"/>
+                    <a:pt x="453883" y="541212"/>
+                    <a:pt x="497606" y="497541"/>
+                  </a:cubicBezTo>
+                  <a:cubicBezTo>
+                    <a:pt x="587722" y="407424"/>
+                    <a:pt x="587722" y="260741"/>
+                    <a:pt x="497606" y="170573"/>
+                  </a:cubicBezTo>
+                  <a:cubicBezTo>
+                    <a:pt x="453883" y="126851"/>
+                    <a:pt x="395826" y="102858"/>
+                    <a:pt x="334070" y="102858"/>
+                  </a:cubicBezTo>
+                  <a:close/>
+                </a:path>
+              </a:pathLst>
+            </a:custGeom>
+            <a:ln w="51336" cap="flat">
+              <a:noFill/>
+              <a:prstDash val="solid"/>
+              <a:miter/>
+            </a:ln>
+          </p:spPr>
+          <p:txBody>
+            <a:bodyPr rtlCol="0" anchor="ctr"/>
+            <a:lstStyle/>
+            <a:p>
+              <a:endParaRPr lang="en-US" sz="2400"/>
+            </a:p>
+          </p:txBody>
+        </p:sp>
+        <p:sp useBgFill="1">
+          <p:nvSpPr>
+            <p:cNvPr id="9" name="Freeform: Shape 8">
+              <a:extLst>
+                <a:ext uri="{FF2B5EF4-FFF2-40B4-BE49-F238E27FC236}">
+                  <a16:creationId xmlns:a16="http://schemas.microsoft.com/office/drawing/2014/main" id="{833071C1-7A54-2BD3-33B7-11700A1CF2BC}"/>
+                </a:ext>
+              </a:extLst>
+            </p:cNvPr>
+            <p:cNvSpPr/>
+            <p:nvPr/>
+          </p:nvSpPr>
+          <p:spPr>
+            <a:xfrm>
+              <a:off x="3895824" y="1114381"/>
+              <a:ext cx="4509588" cy="4509572"/>
+            </a:xfrm>
+            <a:custGeom>
+              <a:avLst/>
+              <a:gdLst>
+                <a:gd name="connsiteX0" fmla="*/ 3174533 w 4509588"/>
+                <a:gd name="connsiteY0" fmla="*/ 2684874 h 4509572"/>
+                <a:gd name="connsiteX1" fmla="*/ 4508913 w 4509588"/>
+                <a:gd name="connsiteY1" fmla="*/ 190489 h 4509572"/>
+                <a:gd name="connsiteX2" fmla="*/ 4458615 w 4509588"/>
+                <a:gd name="connsiteY2" fmla="*/ 51153 h 4509572"/>
+                <a:gd name="connsiteX3" fmla="*/ 4319227 w 4509588"/>
+                <a:gd name="connsiteY3" fmla="*/ 854 h 4509572"/>
+                <a:gd name="connsiteX4" fmla="*/ 1824688 w 4509588"/>
+                <a:gd name="connsiteY4" fmla="*/ 1335594 h 4509572"/>
+                <a:gd name="connsiteX5" fmla="*/ 866855 w 4509588"/>
+                <a:gd name="connsiteY5" fmla="*/ 1311293 h 4509572"/>
+                <a:gd name="connsiteX6" fmla="*/ 489948 w 4509588"/>
+                <a:gd name="connsiteY6" fmla="*/ 1461880 h 4509572"/>
+                <a:gd name="connsiteX7" fmla="*/ 53290 w 4509588"/>
+                <a:gd name="connsiteY7" fmla="*/ 1898539 h 4509572"/>
+                <a:gd name="connsiteX8" fmla="*/ 6330 w 4509588"/>
+                <a:gd name="connsiteY8" fmla="*/ 2073172 h 4509572"/>
+                <a:gd name="connsiteX9" fmla="*/ 134261 w 4509588"/>
+                <a:gd name="connsiteY9" fmla="*/ 2201410 h 4509572"/>
+                <a:gd name="connsiteX10" fmla="*/ 1295036 w 4509588"/>
+                <a:gd name="connsiteY10" fmla="*/ 2508032 h 4509572"/>
+                <a:gd name="connsiteX11" fmla="*/ 1308189 w 4509588"/>
+                <a:gd name="connsiteY11" fmla="*/ 2509728 h 4509572"/>
+                <a:gd name="connsiteX12" fmla="*/ 1357819 w 4509588"/>
+                <a:gd name="connsiteY12" fmla="*/ 2471503 h 4509572"/>
+                <a:gd name="connsiteX13" fmla="*/ 1321290 w 4509588"/>
+                <a:gd name="connsiteY13" fmla="*/ 2408668 h 4509572"/>
+                <a:gd name="connsiteX14" fmla="*/ 160874 w 4509588"/>
+                <a:gd name="connsiteY14" fmla="*/ 2102149 h 4509572"/>
+                <a:gd name="connsiteX15" fmla="*/ 105695 w 4509588"/>
+                <a:gd name="connsiteY15" fmla="*/ 2046712 h 4509572"/>
+                <a:gd name="connsiteX16" fmla="*/ 125989 w 4509588"/>
+                <a:gd name="connsiteY16" fmla="*/ 1971187 h 4509572"/>
+                <a:gd name="connsiteX17" fmla="*/ 562648 w 4509588"/>
+                <a:gd name="connsiteY17" fmla="*/ 1534528 h 4509572"/>
+                <a:gd name="connsiteX18" fmla="*/ 864337 w 4509588"/>
+                <a:gd name="connsiteY18" fmla="*/ 1413996 h 4509572"/>
+                <a:gd name="connsiteX19" fmla="*/ 1841900 w 4509588"/>
+                <a:gd name="connsiteY19" fmla="*/ 1438761 h 4509572"/>
+                <a:gd name="connsiteX20" fmla="*/ 1849863 w 4509588"/>
+                <a:gd name="connsiteY20" fmla="*/ 1437270 h 4509572"/>
+                <a:gd name="connsiteX21" fmla="*/ 1860601 w 4509588"/>
+                <a:gd name="connsiteY21" fmla="*/ 1435267 h 4509572"/>
+                <a:gd name="connsiteX22" fmla="*/ 1865688 w 4509588"/>
+                <a:gd name="connsiteY22" fmla="*/ 1432441 h 4509572"/>
+                <a:gd name="connsiteX23" fmla="*/ 1876734 w 4509588"/>
+                <a:gd name="connsiteY23" fmla="*/ 1426276 h 4509572"/>
+                <a:gd name="connsiteX24" fmla="*/ 4328784 w 4509588"/>
+                <a:gd name="connsiteY24" fmla="*/ 103147 h 4509572"/>
+                <a:gd name="connsiteX25" fmla="*/ 4385864 w 4509588"/>
+                <a:gd name="connsiteY25" fmla="*/ 123801 h 4509572"/>
+                <a:gd name="connsiteX26" fmla="*/ 4406466 w 4509588"/>
+                <a:gd name="connsiteY26" fmla="*/ 180882 h 4509572"/>
+                <a:gd name="connsiteX27" fmla="*/ 3096490 w 4509588"/>
+                <a:gd name="connsiteY27" fmla="*/ 2617929 h 4509572"/>
+                <a:gd name="connsiteX28" fmla="*/ 3091764 w 4509588"/>
+                <a:gd name="connsiteY28" fmla="*/ 2626406 h 4509572"/>
+                <a:gd name="connsiteX29" fmla="*/ 3070853 w 4509588"/>
+                <a:gd name="connsiteY29" fmla="*/ 2667919 h 4509572"/>
+                <a:gd name="connsiteX30" fmla="*/ 3095566 w 4509588"/>
+                <a:gd name="connsiteY30" fmla="*/ 3645431 h 4509572"/>
+                <a:gd name="connsiteX31" fmla="*/ 2975085 w 4509588"/>
+                <a:gd name="connsiteY31" fmla="*/ 3947068 h 4509572"/>
+                <a:gd name="connsiteX32" fmla="*/ 2538426 w 4509588"/>
+                <a:gd name="connsiteY32" fmla="*/ 4383727 h 4509572"/>
+                <a:gd name="connsiteX33" fmla="*/ 2462901 w 4509588"/>
+                <a:gd name="connsiteY33" fmla="*/ 4404073 h 4509572"/>
+                <a:gd name="connsiteX34" fmla="*/ 2407465 w 4509588"/>
+                <a:gd name="connsiteY34" fmla="*/ 4348893 h 4509572"/>
+                <a:gd name="connsiteX35" fmla="*/ 2089591 w 4509588"/>
+                <a:gd name="connsiteY35" fmla="*/ 3176815 h 4509572"/>
+                <a:gd name="connsiteX36" fmla="*/ 2026551 w 4509588"/>
+                <a:gd name="connsiteY36" fmla="*/ 3140696 h 4509572"/>
+                <a:gd name="connsiteX37" fmla="*/ 1990381 w 4509588"/>
+                <a:gd name="connsiteY37" fmla="*/ 3203737 h 4509572"/>
+                <a:gd name="connsiteX38" fmla="*/ 2308306 w 4509588"/>
+                <a:gd name="connsiteY38" fmla="*/ 4375815 h 4509572"/>
+                <a:gd name="connsiteX39" fmla="*/ 2436390 w 4509588"/>
+                <a:gd name="connsiteY39" fmla="*/ 4503386 h 4509572"/>
+                <a:gd name="connsiteX40" fmla="*/ 2483863 w 4509588"/>
+                <a:gd name="connsiteY40" fmla="*/ 4509654 h 4509572"/>
+                <a:gd name="connsiteX41" fmla="*/ 2611074 w 4509588"/>
+                <a:gd name="connsiteY41" fmla="*/ 4456427 h 4509572"/>
+                <a:gd name="connsiteX42" fmla="*/ 3047733 w 4509588"/>
+                <a:gd name="connsiteY42" fmla="*/ 4019768 h 4509572"/>
+                <a:gd name="connsiteX43" fmla="*/ 3198321 w 4509588"/>
+                <a:gd name="connsiteY43" fmla="*/ 3642862 h 4509572"/>
+                <a:gd name="connsiteX44" fmla="*/ 3174071 w 4509588"/>
+                <a:gd name="connsiteY44" fmla="*/ 2685182 h 4509572"/>
+                <a:gd name="connsiteX45" fmla="*/ 3174533 w 4509588"/>
+                <a:gd name="connsiteY45" fmla="*/ 2684874 h 4509572"/>
+              </a:gdLst>
+              <a:ahLst/>
+              <a:cxnLst>
+                <a:cxn ang="0">
+                  <a:pos x="connsiteX0" y="connsiteY0"/>
+                </a:cxn>
+                <a:cxn ang="0">
+                  <a:pos x="connsiteX1" y="connsiteY1"/>
+                </a:cxn>
+                <a:cxn ang="0">
+                  <a:pos x="connsiteX2" y="connsiteY2"/>
+                </a:cxn>
+                <a:cxn ang="0">
+                  <a:pos x="connsiteX3" y="connsiteY3"/>
+                </a:cxn>
+                <a:cxn ang="0">
+                  <a:pos x="connsiteX4" y="connsiteY4"/>
+                </a:cxn>
+                <a:cxn ang="0">
+                  <a:pos x="connsiteX5" y="connsiteY5"/>
+                </a:cxn>
+                <a:cxn ang="0">
+                  <a:pos x="connsiteX6" y="connsiteY6"/>
+                </a:cxn>
+                <a:cxn ang="0">
+                  <a:pos x="connsiteX7" y="connsiteY7"/>
+                </a:cxn>
+                <a:cxn ang="0">
+                  <a:pos x="connsiteX8" y="connsiteY8"/>
+                </a:cxn>
+                <a:cxn ang="0">
+                  <a:pos x="connsiteX9" y="connsiteY9"/>
+                </a:cxn>
+                <a:cxn ang="0">
+                  <a:pos x="connsiteX10" y="connsiteY10"/>
+                </a:cxn>
+                <a:cxn ang="0">
+                  <a:pos x="connsiteX11" y="connsiteY11"/>
+                </a:cxn>
+                <a:cxn ang="0">
+                  <a:pos x="connsiteX12" y="connsiteY12"/>
+                </a:cxn>
+                <a:cxn ang="0">
+                  <a:pos x="connsiteX13" y="connsiteY13"/>
+                </a:cxn>
+                <a:cxn ang="0">
+                  <a:pos x="connsiteX14" y="connsiteY14"/>
+                </a:cxn>
+                <a:cxn ang="0">
+                  <a:pos x="connsiteX15" y="connsiteY15"/>
+                </a:cxn>
+                <a:cxn ang="0">
+                  <a:pos x="connsiteX16" y="connsiteY16"/>
+                </a:cxn>
+                <a:cxn ang="0">
+                  <a:pos x="connsiteX17" y="connsiteY17"/>
+                </a:cxn>
+                <a:cxn ang="0">
+                  <a:pos x="connsiteX18" y="connsiteY18"/>
+                </a:cxn>
+                <a:cxn ang="0">
+                  <a:pos x="connsiteX19" y="connsiteY19"/>
+                </a:cxn>
+                <a:cxn ang="0">
+                  <a:pos x="connsiteX20" y="connsiteY20"/>
+                </a:cxn>
+                <a:cxn ang="0">
+                  <a:pos x="connsiteX21" y="connsiteY21"/>
+                </a:cxn>
+                <a:cxn ang="0">
+                  <a:pos x="connsiteX22" y="connsiteY22"/>
+                </a:cxn>
+                <a:cxn ang="0">
+                  <a:pos x="connsiteX23" y="connsiteY23"/>
+                </a:cxn>
+                <a:cxn ang="0">
+                  <a:pos x="connsiteX24" y="connsiteY24"/>
+                </a:cxn>
+                <a:cxn ang="0">
+                  <a:pos x="connsiteX25" y="connsiteY25"/>
+                </a:cxn>
+                <a:cxn ang="0">
+                  <a:pos x="connsiteX26" y="connsiteY26"/>
+                </a:cxn>
+                <a:cxn ang="0">
+                  <a:pos x="connsiteX27" y="connsiteY27"/>
+                </a:cxn>
+                <a:cxn ang="0">
+                  <a:pos x="connsiteX28" y="connsiteY28"/>
+                </a:cxn>
+                <a:cxn ang="0">
+                  <a:pos x="connsiteX29" y="connsiteY29"/>
+                </a:cxn>
+                <a:cxn ang="0">
+                  <a:pos x="connsiteX30" y="connsiteY30"/>
+                </a:cxn>
+                <a:cxn ang="0">
+                  <a:pos x="connsiteX31" y="connsiteY31"/>
+                </a:cxn>
+                <a:cxn ang="0">
+                  <a:pos x="connsiteX32" y="connsiteY32"/>
+                </a:cxn>
+                <a:cxn ang="0">
+                  <a:pos x="connsiteX33" y="connsiteY33"/>
+                </a:cxn>
+                <a:cxn ang="0">
+                  <a:pos x="connsiteX34" y="connsiteY34"/>
+                </a:cxn>
+                <a:cxn ang="0">
+                  <a:pos x="connsiteX35" y="connsiteY35"/>
+                </a:cxn>
+                <a:cxn ang="0">
+                  <a:pos x="connsiteX36" y="connsiteY36"/>
+                </a:cxn>
+                <a:cxn ang="0">
+                  <a:pos x="connsiteX37" y="connsiteY37"/>
+                </a:cxn>
+                <a:cxn ang="0">
+                  <a:pos x="connsiteX38" y="connsiteY38"/>
+                </a:cxn>
+                <a:cxn ang="0">
+                  <a:pos x="connsiteX39" y="connsiteY39"/>
+                </a:cxn>
+                <a:cxn ang="0">
+                  <a:pos x="connsiteX40" y="connsiteY40"/>
+                </a:cxn>
+                <a:cxn ang="0">
+                  <a:pos x="connsiteX41" y="connsiteY41"/>
+                </a:cxn>
+                <a:cxn ang="0">
+                  <a:pos x="connsiteX42" y="connsiteY42"/>
+                </a:cxn>
+                <a:cxn ang="0">
+                  <a:pos x="connsiteX43" y="connsiteY43"/>
+                </a:cxn>
+                <a:cxn ang="0">
+                  <a:pos x="connsiteX44" y="connsiteY44"/>
+                </a:cxn>
+                <a:cxn ang="0">
+                  <a:pos x="connsiteX45" y="connsiteY45"/>
+                </a:cxn>
+              </a:cxnLst>
+              <a:rect l="l" t="t" r="r" b="b"/>
+              <a:pathLst>
+                <a:path w="4509588" h="4509572">
+                  <a:moveTo>
+                    <a:pt x="3174533" y="2684874"/>
+                  </a:moveTo>
+                  <a:cubicBezTo>
+                    <a:pt x="3994263" y="1731099"/>
+                    <a:pt x="4443201" y="891845"/>
+                    <a:pt x="4508913" y="190489"/>
+                  </a:cubicBezTo>
+                  <a:cubicBezTo>
+                    <a:pt x="4513743" y="138752"/>
+                    <a:pt x="4495401" y="87939"/>
+                    <a:pt x="4458615" y="51153"/>
+                  </a:cubicBezTo>
+                  <a:cubicBezTo>
+                    <a:pt x="4421828" y="14367"/>
+                    <a:pt x="4371221" y="-4027"/>
+                    <a:pt x="4319227" y="854"/>
+                  </a:cubicBezTo>
+                  <a:cubicBezTo>
+                    <a:pt x="3617871" y="66515"/>
+                    <a:pt x="2778566" y="515761"/>
+                    <a:pt x="1824688" y="1335594"/>
+                  </a:cubicBezTo>
+                  <a:lnTo>
+                    <a:pt x="866855" y="1311293"/>
+                  </a:lnTo>
+                  <a:cubicBezTo>
+                    <a:pt x="725823" y="1306669"/>
+                    <a:pt x="589159" y="1362619"/>
+                    <a:pt x="489948" y="1461880"/>
+                  </a:cubicBezTo>
+                  <a:lnTo>
+                    <a:pt x="53290" y="1898539"/>
+                  </a:lnTo>
+                  <a:cubicBezTo>
+                    <a:pt x="7101" y="1944727"/>
+                    <a:pt x="-10470" y="2010028"/>
+                    <a:pt x="6330" y="2073172"/>
+                  </a:cubicBezTo>
+                  <a:cubicBezTo>
+                    <a:pt x="23131" y="2136315"/>
+                    <a:pt x="70861" y="2184250"/>
+                    <a:pt x="134261" y="2201410"/>
+                  </a:cubicBezTo>
+                  <a:lnTo>
+                    <a:pt x="1295036" y="2508032"/>
+                  </a:lnTo>
+                  <a:cubicBezTo>
+                    <a:pt x="1299403" y="2509162"/>
+                    <a:pt x="1303822" y="2509728"/>
+                    <a:pt x="1308189" y="2509728"/>
+                  </a:cubicBezTo>
+                  <a:cubicBezTo>
+                    <a:pt x="1330949" y="2509728"/>
+                    <a:pt x="1351757" y="2494520"/>
+                    <a:pt x="1357819" y="2471503"/>
+                  </a:cubicBezTo>
+                  <a:cubicBezTo>
+                    <a:pt x="1365064" y="2444067"/>
+                    <a:pt x="1348726" y="2415912"/>
+                    <a:pt x="1321290" y="2408668"/>
+                  </a:cubicBezTo>
+                  <a:lnTo>
+                    <a:pt x="160874" y="2102149"/>
+                  </a:lnTo>
+                  <a:cubicBezTo>
+                    <a:pt x="133593" y="2094750"/>
+                    <a:pt x="112939" y="2074045"/>
+                    <a:pt x="105695" y="2046712"/>
+                  </a:cubicBezTo>
+                  <a:cubicBezTo>
+                    <a:pt x="98399" y="2019431"/>
+                    <a:pt x="106003" y="1991173"/>
+                    <a:pt x="125989" y="1971187"/>
+                  </a:cubicBezTo>
+                  <a:lnTo>
+                    <a:pt x="562648" y="1534528"/>
+                  </a:lnTo>
+                  <a:cubicBezTo>
+                    <a:pt x="642077" y="1455099"/>
+                    <a:pt x="752077" y="1411325"/>
+                    <a:pt x="864337" y="1413996"/>
+                  </a:cubicBezTo>
+                  <a:lnTo>
+                    <a:pt x="1841900" y="1438761"/>
+                  </a:lnTo>
+                  <a:cubicBezTo>
+                    <a:pt x="1844674" y="1438812"/>
+                    <a:pt x="1847192" y="1437682"/>
+                    <a:pt x="1849863" y="1437270"/>
+                  </a:cubicBezTo>
+                  <a:cubicBezTo>
+                    <a:pt x="1853511" y="1436808"/>
+                    <a:pt x="1857108" y="1436500"/>
+                    <a:pt x="1860601" y="1435267"/>
+                  </a:cubicBezTo>
+                  <a:cubicBezTo>
+                    <a:pt x="1862451" y="1434547"/>
+                    <a:pt x="1863941" y="1433314"/>
+                    <a:pt x="1865688" y="1432441"/>
+                  </a:cubicBezTo>
+                  <a:cubicBezTo>
+                    <a:pt x="1869438" y="1430591"/>
+                    <a:pt x="1873394" y="1429101"/>
+                    <a:pt x="1876734" y="1426276"/>
+                  </a:cubicBezTo>
+                  <a:cubicBezTo>
+                    <a:pt x="2820336" y="612300"/>
+                    <a:pt x="3645409" y="167112"/>
+                    <a:pt x="4328784" y="103147"/>
+                  </a:cubicBezTo>
+                  <a:cubicBezTo>
+                    <a:pt x="4349848" y="101246"/>
+                    <a:pt x="4370810" y="108696"/>
+                    <a:pt x="4385864" y="123801"/>
+                  </a:cubicBezTo>
+                  <a:cubicBezTo>
+                    <a:pt x="4400969" y="138855"/>
+                    <a:pt x="4408470" y="159714"/>
+                    <a:pt x="4406466" y="180882"/>
+                  </a:cubicBezTo>
+                  <a:cubicBezTo>
+                    <a:pt x="4342912" y="860608"/>
+                    <a:pt x="3902143" y="1680544"/>
+                    <a:pt x="3096490" y="2617929"/>
+                  </a:cubicBezTo>
+                  <a:cubicBezTo>
+                    <a:pt x="3094281" y="2620498"/>
+                    <a:pt x="3093356" y="2623580"/>
+                    <a:pt x="3091764" y="2626406"/>
+                  </a:cubicBezTo>
+                  <a:cubicBezTo>
+                    <a:pt x="3079073" y="2636065"/>
+                    <a:pt x="3070442" y="2650759"/>
+                    <a:pt x="3070853" y="2667919"/>
+                  </a:cubicBezTo>
+                  <a:lnTo>
+                    <a:pt x="3095566" y="3645431"/>
+                  </a:lnTo>
+                  <a:cubicBezTo>
+                    <a:pt x="3098443" y="3757793"/>
+                    <a:pt x="3054515" y="3867690"/>
+                    <a:pt x="2975085" y="3947068"/>
+                  </a:cubicBezTo>
+                  <a:lnTo>
+                    <a:pt x="2538426" y="4383727"/>
+                  </a:lnTo>
+                  <a:cubicBezTo>
+                    <a:pt x="2518441" y="4403713"/>
+                    <a:pt x="2490337" y="4411266"/>
+                    <a:pt x="2462901" y="4404073"/>
+                  </a:cubicBezTo>
+                  <a:cubicBezTo>
+                    <a:pt x="2435568" y="4396777"/>
+                    <a:pt x="2414863" y="4376175"/>
+                    <a:pt x="2407465" y="4348893"/>
+                  </a:cubicBezTo>
+                  <a:lnTo>
+                    <a:pt x="2089591" y="3176815"/>
+                  </a:lnTo>
+                  <a:cubicBezTo>
+                    <a:pt x="2082141" y="3149482"/>
+                    <a:pt x="2054038" y="3133041"/>
+                    <a:pt x="2026551" y="3140696"/>
+                  </a:cubicBezTo>
+                  <a:cubicBezTo>
+                    <a:pt x="1999167" y="3148146"/>
+                    <a:pt x="1982983" y="3176301"/>
+                    <a:pt x="1990381" y="3203737"/>
+                  </a:cubicBezTo>
+                  <a:lnTo>
+                    <a:pt x="2308306" y="4375815"/>
+                  </a:lnTo>
+                  <a:cubicBezTo>
+                    <a:pt x="2325363" y="4438907"/>
+                    <a:pt x="2373299" y="4486534"/>
+                    <a:pt x="2436390" y="4503386"/>
+                  </a:cubicBezTo>
+                  <a:cubicBezTo>
+                    <a:pt x="2452215" y="4507599"/>
+                    <a:pt x="2468090" y="4509654"/>
+                    <a:pt x="2483863" y="4509654"/>
+                  </a:cubicBezTo>
+                  <a:cubicBezTo>
+                    <a:pt x="2531028" y="4509603"/>
+                    <a:pt x="2576446" y="4491107"/>
+                    <a:pt x="2611074" y="4456427"/>
+                  </a:cubicBezTo>
+                  <a:lnTo>
+                    <a:pt x="3047733" y="4019768"/>
+                  </a:lnTo>
+                  <a:cubicBezTo>
+                    <a:pt x="3146995" y="3920609"/>
+                    <a:pt x="3201815" y="3783225"/>
+                    <a:pt x="3198321" y="3642862"/>
+                  </a:cubicBezTo>
+                  <a:lnTo>
+                    <a:pt x="3174071" y="2685182"/>
+                  </a:lnTo>
+                  <a:cubicBezTo>
+                    <a:pt x="3174276" y="2685028"/>
+                    <a:pt x="3174430" y="2684977"/>
+                    <a:pt x="3174533" y="2684874"/>
+                  </a:cubicBezTo>
+                  <a:close/>
+                </a:path>
+              </a:pathLst>
+            </a:custGeom>
+            <a:ln w="51336" cap="flat">
+              <a:noFill/>
+              <a:prstDash val="solid"/>
+              <a:miter/>
+            </a:ln>
+          </p:spPr>
+          <p:txBody>
+            <a:bodyPr rtlCol="0" anchor="ctr"/>
+            <a:lstStyle/>
+            <a:p>
+              <a:endParaRPr lang="en-US" sz="2400" dirty="0"/>
+            </a:p>
+          </p:txBody>
+        </p:sp>
+      </p:grpSp>
+    </p:spTree>
+    <p:extLst>
+      <p:ext uri="{BB962C8B-B14F-4D97-AF65-F5344CB8AC3E}">
+        <p14:creationId xmlns:p14="http://schemas.microsoft.com/office/powerpoint/2010/main" val="1463997164"/>
+      </p:ext>
+    </p:extLst>
+  </p:cSld>
+  <p:clrMapOvr>
+    <a:masterClrMapping/>
+  </p:clrMapOvr>
+</p:sld>
+</file>
+
 <file path=ppt/theme/theme1.xml><?xml version="1.0" encoding="utf-8"?>
 <a:theme xmlns:a="http://schemas.openxmlformats.org/drawingml/2006/main" name="Office Theme">
   <a:themeElements>

</xml_diff>